<commit_message>
Compress presolve function for FMtlist and now using presolve iteration in parameters
</commit_message>
<xml_diff>
--- a/Documentation/FMT_Presolve.pptx
+++ b/Documentation/FMT_Presolve.pptx
@@ -215,7 +215,7 @@
           <p:cNvPr id="4098" name="Rectangle 2">
             <a:extLst>
               <a:ext uri="{FF2B5EF4-FFF2-40B4-BE49-F238E27FC236}">
-                <a16:creationId xmlns:a16="http://schemas.microsoft.com/office/drawing/2014/main" xmlns="" id="{90000FB4-732C-304F-ABAC-DF5E79C70A33}"/>
+                <a16:creationId xmlns="" xmlns:a16="http://schemas.microsoft.com/office/drawing/2014/main" id="{90000FB4-732C-304F-ABAC-DF5E79C70A33}"/>
               </a:ext>
             </a:extLst>
           </p:cNvPr>
@@ -267,7 +267,7 @@
           <p:cNvPr id="4099" name="Rectangle 3">
             <a:extLst>
               <a:ext uri="{FF2B5EF4-FFF2-40B4-BE49-F238E27FC236}">
-                <a16:creationId xmlns:a16="http://schemas.microsoft.com/office/drawing/2014/main" xmlns="" id="{24B32E97-02BD-1046-B274-E90FCC0FE720}"/>
+                <a16:creationId xmlns="" xmlns:a16="http://schemas.microsoft.com/office/drawing/2014/main" id="{24B32E97-02BD-1046-B274-E90FCC0FE720}"/>
               </a:ext>
             </a:extLst>
           </p:cNvPr>
@@ -314,7 +314,7 @@
               <a:pPr>
                 <a:defRPr/>
               </a:pPr>
-              <a:t>2022-02-22</a:t>
+              <a:t>2022-03-02</a:t>
             </a:fld>
             <a:endParaRPr lang="fr-FR" altLang="fr-FR"/>
           </a:p>
@@ -325,7 +325,7 @@
           <p:cNvPr id="4100" name="Rectangle 4">
             <a:extLst>
               <a:ext uri="{FF2B5EF4-FFF2-40B4-BE49-F238E27FC236}">
-                <a16:creationId xmlns:a16="http://schemas.microsoft.com/office/drawing/2014/main" xmlns="" id="{F2031963-01E9-DA4D-8753-FC566AD7D859}"/>
+                <a16:creationId xmlns="" xmlns:a16="http://schemas.microsoft.com/office/drawing/2014/main" id="{F2031963-01E9-DA4D-8753-FC566AD7D859}"/>
               </a:ext>
             </a:extLst>
           </p:cNvPr>
@@ -377,7 +377,7 @@
           <p:cNvPr id="4101" name="Rectangle 5">
             <a:extLst>
               <a:ext uri="{FF2B5EF4-FFF2-40B4-BE49-F238E27FC236}">
-                <a16:creationId xmlns:a16="http://schemas.microsoft.com/office/drawing/2014/main" xmlns="" id="{206707E7-D6C2-404A-A462-E3EAC5A3F62D}"/>
+                <a16:creationId xmlns="" xmlns:a16="http://schemas.microsoft.com/office/drawing/2014/main" id="{206707E7-D6C2-404A-A462-E3EAC5A3F62D}"/>
               </a:ext>
             </a:extLst>
           </p:cNvPr>
@@ -469,7 +469,7 @@
           <p:cNvPr id="2" name="Espace réservé de l'en-tête 1">
             <a:extLst>
               <a:ext uri="{FF2B5EF4-FFF2-40B4-BE49-F238E27FC236}">
-                <a16:creationId xmlns:a16="http://schemas.microsoft.com/office/drawing/2014/main" xmlns="" id="{AD31334D-A344-1848-8B76-4D4A38D8E8D0}"/>
+                <a16:creationId xmlns="" xmlns:a16="http://schemas.microsoft.com/office/drawing/2014/main" id="{AD31334D-A344-1848-8B76-4D4A38D8E8D0}"/>
               </a:ext>
             </a:extLst>
           </p:cNvPr>
@@ -513,7 +513,7 @@
           <p:cNvPr id="3" name="Espace réservé de la date 2">
             <a:extLst>
               <a:ext uri="{FF2B5EF4-FFF2-40B4-BE49-F238E27FC236}">
-                <a16:creationId xmlns:a16="http://schemas.microsoft.com/office/drawing/2014/main" xmlns="" id="{56C2149E-975F-0A4E-AAFA-F24C18D34B2C}"/>
+                <a16:creationId xmlns="" xmlns:a16="http://schemas.microsoft.com/office/drawing/2014/main" id="{56C2149E-975F-0A4E-AAFA-F24C18D34B2C}"/>
               </a:ext>
             </a:extLst>
           </p:cNvPr>
@@ -556,7 +556,7 @@
               <a:pPr>
                 <a:defRPr/>
               </a:pPr>
-              <a:t>2022-02-22</a:t>
+              <a:t>2022-03-02</a:t>
             </a:fld>
             <a:endParaRPr lang="fr-FR" altLang="fr-FR"/>
           </a:p>
@@ -567,7 +567,7 @@
           <p:cNvPr id="4" name="Espace réservé de l'image des diapositives 3">
             <a:extLst>
               <a:ext uri="{FF2B5EF4-FFF2-40B4-BE49-F238E27FC236}">
-                <a16:creationId xmlns:a16="http://schemas.microsoft.com/office/drawing/2014/main" xmlns="" id="{235D1E7E-1754-3641-878F-BE7749996731}"/>
+                <a16:creationId xmlns="" xmlns:a16="http://schemas.microsoft.com/office/drawing/2014/main" id="{235D1E7E-1754-3641-878F-BE7749996731}"/>
               </a:ext>
             </a:extLst>
           </p:cNvPr>
@@ -607,7 +607,7 @@
           <p:cNvPr id="5" name="Espace réservé des commentaires 4">
             <a:extLst>
               <a:ext uri="{FF2B5EF4-FFF2-40B4-BE49-F238E27FC236}">
-                <a16:creationId xmlns:a16="http://schemas.microsoft.com/office/drawing/2014/main" xmlns="" id="{4A046B4D-F677-3A4A-9A54-2108A90395A3}"/>
+                <a16:creationId xmlns="" xmlns:a16="http://schemas.microsoft.com/office/drawing/2014/main" id="{4A046B4D-F677-3A4A-9A54-2108A90395A3}"/>
               </a:ext>
             </a:extLst>
           </p:cNvPr>
@@ -677,7 +677,7 @@
           <p:cNvPr id="6" name="Espace réservé du pied de page 5">
             <a:extLst>
               <a:ext uri="{FF2B5EF4-FFF2-40B4-BE49-F238E27FC236}">
-                <a16:creationId xmlns:a16="http://schemas.microsoft.com/office/drawing/2014/main" xmlns="" id="{C64E5D71-4987-744A-AA33-959CF89890FE}"/>
+                <a16:creationId xmlns="" xmlns:a16="http://schemas.microsoft.com/office/drawing/2014/main" id="{C64E5D71-4987-744A-AA33-959CF89890FE}"/>
               </a:ext>
             </a:extLst>
           </p:cNvPr>
@@ -721,7 +721,7 @@
           <p:cNvPr id="7" name="Espace réservé du numéro de diapositive 6">
             <a:extLst>
               <a:ext uri="{FF2B5EF4-FFF2-40B4-BE49-F238E27FC236}">
-                <a16:creationId xmlns:a16="http://schemas.microsoft.com/office/drawing/2014/main" xmlns="" id="{605EF121-2A48-9645-BD74-2E892ADA1351}"/>
+                <a16:creationId xmlns="" xmlns:a16="http://schemas.microsoft.com/office/drawing/2014/main" id="{605EF121-2A48-9645-BD74-2E892ADA1351}"/>
               </a:ext>
             </a:extLst>
           </p:cNvPr>
@@ -1046,7 +1046,7 @@
           <p:cNvPr id="2" name="Rectangle 2">
             <a:extLst>
               <a:ext uri="{FF2B5EF4-FFF2-40B4-BE49-F238E27FC236}">
-                <a16:creationId xmlns:a16="http://schemas.microsoft.com/office/drawing/2014/main" xmlns="" id="{805280BA-D4E5-884B-BA08-3871D8D5E3DF}"/>
+                <a16:creationId xmlns="" xmlns:a16="http://schemas.microsoft.com/office/drawing/2014/main" id="{805280BA-D4E5-884B-BA08-3871D8D5E3DF}"/>
               </a:ext>
             </a:extLst>
           </p:cNvPr>
@@ -1092,7 +1092,7 @@
           <p:cNvPr id="3" name="Rectangle 3">
             <a:extLst>
               <a:ext uri="{FF2B5EF4-FFF2-40B4-BE49-F238E27FC236}">
-                <a16:creationId xmlns:a16="http://schemas.microsoft.com/office/drawing/2014/main" xmlns="" id="{E4DD9B8A-C579-D043-A90E-F85E3BAAF117}"/>
+                <a16:creationId xmlns="" xmlns:a16="http://schemas.microsoft.com/office/drawing/2014/main" id="{E4DD9B8A-C579-D043-A90E-F85E3BAAF117}"/>
               </a:ext>
             </a:extLst>
           </p:cNvPr>
@@ -1278,7 +1278,7 @@
           <p:cNvPr id="4" name="Rectangle 6">
             <a:extLst>
               <a:ext uri="{FF2B5EF4-FFF2-40B4-BE49-F238E27FC236}">
-                <a16:creationId xmlns:a16="http://schemas.microsoft.com/office/drawing/2014/main" xmlns="" id="{FD95D089-71B6-2049-A638-C5ACEFE2B0E2}"/>
+                <a16:creationId xmlns="" xmlns:a16="http://schemas.microsoft.com/office/drawing/2014/main" id="{FD95D089-71B6-2049-A638-C5ACEFE2B0E2}"/>
               </a:ext>
             </a:extLst>
           </p:cNvPr>
@@ -1353,7 +1353,7 @@
           <p:cNvPr id="2" name="Rectangle 6">
             <a:extLst>
               <a:ext uri="{FF2B5EF4-FFF2-40B4-BE49-F238E27FC236}">
-                <a16:creationId xmlns:a16="http://schemas.microsoft.com/office/drawing/2014/main" xmlns="" id="{EAD6387B-1425-7047-931A-4FF9D6AFC3F4}"/>
+                <a16:creationId xmlns="" xmlns:a16="http://schemas.microsoft.com/office/drawing/2014/main" id="{EAD6387B-1425-7047-931A-4FF9D6AFC3F4}"/>
               </a:ext>
             </a:extLst>
           </p:cNvPr>
@@ -1398,7 +1398,7 @@
           <p:cNvPr id="4" name="Espace réservé du contenu 2">
             <a:extLst>
               <a:ext uri="{FF2B5EF4-FFF2-40B4-BE49-F238E27FC236}">
-                <a16:creationId xmlns:a16="http://schemas.microsoft.com/office/drawing/2014/main" xmlns="" id="{D9694374-1ECE-D046-BA62-7CFF281555BA}"/>
+                <a16:creationId xmlns="" xmlns:a16="http://schemas.microsoft.com/office/drawing/2014/main" id="{D9694374-1ECE-D046-BA62-7CFF281555BA}"/>
               </a:ext>
             </a:extLst>
           </p:cNvPr>
@@ -1465,7 +1465,7 @@
           <p:cNvPr id="5" name="Rectangle 2">
             <a:extLst>
               <a:ext uri="{FF2B5EF4-FFF2-40B4-BE49-F238E27FC236}">
-                <a16:creationId xmlns:a16="http://schemas.microsoft.com/office/drawing/2014/main" xmlns="" id="{5E98F860-71BA-C849-9614-EDA80DF350E1}"/>
+                <a16:creationId xmlns="" xmlns:a16="http://schemas.microsoft.com/office/drawing/2014/main" id="{5E98F860-71BA-C849-9614-EDA80DF350E1}"/>
               </a:ext>
             </a:extLst>
           </p:cNvPr>
@@ -1566,7 +1566,7 @@
           <p:cNvPr id="3" name="Rectangle 3">
             <a:extLst>
               <a:ext uri="{FF2B5EF4-FFF2-40B4-BE49-F238E27FC236}">
-                <a16:creationId xmlns:a16="http://schemas.microsoft.com/office/drawing/2014/main" xmlns="" id="{3F91709A-AC11-BE4A-A166-6E75E802938F}"/>
+                <a16:creationId xmlns="" xmlns:a16="http://schemas.microsoft.com/office/drawing/2014/main" id="{3F91709A-AC11-BE4A-A166-6E75E802938F}"/>
               </a:ext>
             </a:extLst>
           </p:cNvPr>
@@ -2112,7 +2112,7 @@
           <p:cNvPr id="1027" name="Rectangle 2">
             <a:extLst>
               <a:ext uri="{FF2B5EF4-FFF2-40B4-BE49-F238E27FC236}">
-                <a16:creationId xmlns:a16="http://schemas.microsoft.com/office/drawing/2014/main" xmlns="" id="{988116C6-1EEC-AB49-8F6C-0D2306B519A3}"/>
+                <a16:creationId xmlns="" xmlns:a16="http://schemas.microsoft.com/office/drawing/2014/main" id="{988116C6-1EEC-AB49-8F6C-0D2306B519A3}"/>
               </a:ext>
             </a:extLst>
           </p:cNvPr>
@@ -2183,7 +2183,7 @@
           <p:cNvPr id="1028" name="Rectangle 3">
             <a:extLst>
               <a:ext uri="{FF2B5EF4-FFF2-40B4-BE49-F238E27FC236}">
-                <a16:creationId xmlns:a16="http://schemas.microsoft.com/office/drawing/2014/main" xmlns="" id="{DFF316A8-DEA8-6649-ACFC-8CE1338F38CE}"/>
+                <a16:creationId xmlns="" xmlns:a16="http://schemas.microsoft.com/office/drawing/2014/main" id="{DFF316A8-DEA8-6649-ACFC-8CE1338F38CE}"/>
               </a:ext>
             </a:extLst>
           </p:cNvPr>
@@ -2261,7 +2261,7 @@
           <p:cNvPr id="1030" name="Rectangle 6">
             <a:extLst>
               <a:ext uri="{FF2B5EF4-FFF2-40B4-BE49-F238E27FC236}">
-                <a16:creationId xmlns:a16="http://schemas.microsoft.com/office/drawing/2014/main" xmlns="" id="{015A9C91-5968-1B46-9629-80463EDB329F}"/>
+                <a16:creationId xmlns="" xmlns:a16="http://schemas.microsoft.com/office/drawing/2014/main" id="{015A9C91-5968-1B46-9629-80463EDB329F}"/>
               </a:ext>
             </a:extLst>
           </p:cNvPr>
@@ -2765,7 +2765,7 @@
           <p:cNvPr id="2" name="Titre 1">
             <a:extLst>
               <a:ext uri="{FF2B5EF4-FFF2-40B4-BE49-F238E27FC236}">
-                <a16:creationId xmlns:a16="http://schemas.microsoft.com/office/drawing/2014/main" xmlns="" id="{B25FEF62-DBB7-2A48-8198-C132DC947FA7}"/>
+                <a16:creationId xmlns="" xmlns:a16="http://schemas.microsoft.com/office/drawing/2014/main" id="{B25FEF62-DBB7-2A48-8198-C132DC947FA7}"/>
               </a:ext>
             </a:extLst>
           </p:cNvPr>
@@ -2944,18 +2944,6 @@
               </a:rPr>
               <a:t> dans FMT</a:t>
             </a:r>
-            <a:endParaRPr lang="fr-CA" sz="4400" b="1" dirty="0" smtClean="0">
-              <a:solidFill>
-                <a:schemeClr val="bg1"/>
-              </a:solidFill>
-              <a:effectLst>
-                <a:outerShdw blurRad="38100" dist="38100" dir="2700000" algn="tl">
-                  <a:srgbClr val="000000">
-                    <a:alpha val="43137"/>
-                  </a:srgbClr>
-                </a:outerShdw>
-              </a:effectLst>
-            </a:endParaRPr>
           </a:p>
         </p:txBody>
       </p:sp>
@@ -3100,37 +3088,7 @@
                   </a:outerShdw>
                 </a:effectLst>
               </a:rPr>
-              <a:t>Date: </a:t>
-            </a:r>
-            <a:r>
-              <a:rPr lang="fr-CA" dirty="0" smtClean="0">
-                <a:solidFill>
-                  <a:schemeClr val="bg1"/>
-                </a:solidFill>
-                <a:effectLst>
-                  <a:outerShdw blurRad="38100" dist="38100" dir="2700000" algn="tl">
-                    <a:srgbClr val="000000">
-                      <a:alpha val="43137"/>
-                    </a:srgbClr>
-                  </a:outerShdw>
-                </a:effectLst>
-              </a:rPr>
-              <a:t>23 </a:t>
-            </a:r>
-            <a:r>
-              <a:rPr lang="fr-CA" dirty="0" smtClean="0">
-                <a:solidFill>
-                  <a:schemeClr val="bg1"/>
-                </a:solidFill>
-                <a:effectLst>
-                  <a:outerShdw blurRad="38100" dist="38100" dir="2700000" algn="tl">
-                    <a:srgbClr val="000000">
-                      <a:alpha val="43137"/>
-                    </a:srgbClr>
-                  </a:outerShdw>
-                </a:effectLst>
-              </a:rPr>
-              <a:t>février 2022 </a:t>
+              <a:t>Date: 23 février 2022 </a:t>
             </a:r>
             <a:endParaRPr lang="fr-CA" dirty="0">
               <a:solidFill>
@@ -3189,7 +3147,7 @@
           <p:cNvPr id="10241" name="Rectangle 2">
             <a:extLst>
               <a:ext uri="{FF2B5EF4-FFF2-40B4-BE49-F238E27FC236}">
-                <a16:creationId xmlns:a16="http://schemas.microsoft.com/office/drawing/2014/main" xmlns="" id="{2C64CE8F-6DC1-7B46-AA41-065734F9FFFA}"/>
+                <a16:creationId xmlns="" xmlns:a16="http://schemas.microsoft.com/office/drawing/2014/main" id="{2C64CE8F-6DC1-7B46-AA41-065734F9FFFA}"/>
               </a:ext>
             </a:extLst>
           </p:cNvPr>
@@ -3242,7 +3200,7 @@
           <p:cNvPr id="10243" name="Espace réservé du numéro de diapositive 1">
             <a:extLst>
               <a:ext uri="{FF2B5EF4-FFF2-40B4-BE49-F238E27FC236}">
-                <a16:creationId xmlns:a16="http://schemas.microsoft.com/office/drawing/2014/main" xmlns="" id="{A32D7E7E-5EC9-B640-8806-5F060AD25EEB}"/>
+                <a16:creationId xmlns="" xmlns:a16="http://schemas.microsoft.com/office/drawing/2014/main" id="{A32D7E7E-5EC9-B640-8806-5F060AD25EEB}"/>
               </a:ext>
             </a:extLst>
           </p:cNvPr>
@@ -3581,7 +3539,6 @@
               <a:rPr lang="fr-CA" sz="2000" dirty="0" smtClean="0"/>
               <a:t> </a:t>
             </a:r>
-            <a:endParaRPr lang="fr-CA" sz="2000" dirty="0" smtClean="0"/>
           </a:p>
           <a:p>
             <a:pPr lvl="1"/>
@@ -3811,7 +3768,7 @@
           <p:cNvPr id="10241" name="Rectangle 2">
             <a:extLst>
               <a:ext uri="{FF2B5EF4-FFF2-40B4-BE49-F238E27FC236}">
-                <a16:creationId xmlns:a16="http://schemas.microsoft.com/office/drawing/2014/main" xmlns="" id="{2C64CE8F-6DC1-7B46-AA41-065734F9FFFA}"/>
+                <a16:creationId xmlns="" xmlns:a16="http://schemas.microsoft.com/office/drawing/2014/main" id="{2C64CE8F-6DC1-7B46-AA41-065734F9FFFA}"/>
               </a:ext>
             </a:extLst>
           </p:cNvPr>
@@ -3864,7 +3821,7 @@
           <p:cNvPr id="10243" name="Espace réservé du numéro de diapositive 1">
             <a:extLst>
               <a:ext uri="{FF2B5EF4-FFF2-40B4-BE49-F238E27FC236}">
-                <a16:creationId xmlns:a16="http://schemas.microsoft.com/office/drawing/2014/main" xmlns="" id="{A32D7E7E-5EC9-B640-8806-5F060AD25EEB}"/>
+                <a16:creationId xmlns="" xmlns:a16="http://schemas.microsoft.com/office/drawing/2014/main" id="{A32D7E7E-5EC9-B640-8806-5F060AD25EEB}"/>
               </a:ext>
             </a:extLst>
           </p:cNvPr>
@@ -4971,7 +4928,7 @@
           <p:cNvPr id="10241" name="Rectangle 2">
             <a:extLst>
               <a:ext uri="{FF2B5EF4-FFF2-40B4-BE49-F238E27FC236}">
-                <a16:creationId xmlns:a16="http://schemas.microsoft.com/office/drawing/2014/main" xmlns="" id="{2C64CE8F-6DC1-7B46-AA41-065734F9FFFA}"/>
+                <a16:creationId xmlns="" xmlns:a16="http://schemas.microsoft.com/office/drawing/2014/main" id="{2C64CE8F-6DC1-7B46-AA41-065734F9FFFA}"/>
               </a:ext>
             </a:extLst>
           </p:cNvPr>
@@ -5024,7 +4981,7 @@
           <p:cNvPr id="10243" name="Espace réservé du numéro de diapositive 1">
             <a:extLst>
               <a:ext uri="{FF2B5EF4-FFF2-40B4-BE49-F238E27FC236}">
-                <a16:creationId xmlns:a16="http://schemas.microsoft.com/office/drawing/2014/main" xmlns="" id="{A32D7E7E-5EC9-B640-8806-5F060AD25EEB}"/>
+                <a16:creationId xmlns="" xmlns:a16="http://schemas.microsoft.com/office/drawing/2014/main" id="{A32D7E7E-5EC9-B640-8806-5F060AD25EEB}"/>
               </a:ext>
             </a:extLst>
           </p:cNvPr>
@@ -5265,7 +5222,6 @@
               <a:rPr lang="fr-CA" dirty="0" smtClean="0"/>
               <a:t>Retour à l’état initial d’un modèle solutionné:</a:t>
             </a:r>
-            <a:endParaRPr lang="fr-CA" dirty="0" smtClean="0"/>
           </a:p>
           <a:p>
             <a:pPr marL="1257300" lvl="2" indent="-342900">
@@ -5371,7 +5327,6 @@
               <a:rPr lang="fr-CA" dirty="0" smtClean="0"/>
               <a:t> sur le modèle pré-solutionné</a:t>
             </a:r>
-            <a:endParaRPr lang="fr-CA" dirty="0" smtClean="0"/>
           </a:p>
         </p:txBody>
       </p:sp>
@@ -5724,7 +5679,7 @@
           <p:cNvPr id="10241" name="Rectangle 2">
             <a:extLst>
               <a:ext uri="{FF2B5EF4-FFF2-40B4-BE49-F238E27FC236}">
-                <a16:creationId xmlns:a16="http://schemas.microsoft.com/office/drawing/2014/main" xmlns="" id="{2C64CE8F-6DC1-7B46-AA41-065734F9FFFA}"/>
+                <a16:creationId xmlns="" xmlns:a16="http://schemas.microsoft.com/office/drawing/2014/main" id="{2C64CE8F-6DC1-7B46-AA41-065734F9FFFA}"/>
               </a:ext>
             </a:extLst>
           </p:cNvPr>
@@ -5777,7 +5732,7 @@
           <p:cNvPr id="10243" name="Espace réservé du numéro de diapositive 1">
             <a:extLst>
               <a:ext uri="{FF2B5EF4-FFF2-40B4-BE49-F238E27FC236}">
-                <a16:creationId xmlns:a16="http://schemas.microsoft.com/office/drawing/2014/main" xmlns="" id="{A32D7E7E-5EC9-B640-8806-5F060AD25EEB}"/>
+                <a16:creationId xmlns="" xmlns:a16="http://schemas.microsoft.com/office/drawing/2014/main" id="{A32D7E7E-5EC9-B640-8806-5F060AD25EEB}"/>
               </a:ext>
             </a:extLst>
           </p:cNvPr>
@@ -6018,6 +5973,48 @@
               <a:rPr lang="fr-CA" dirty="0" smtClean="0"/>
               <a:t>Réduire la taille du modèle:</a:t>
             </a:r>
+          </a:p>
+          <a:p>
+            <a:pPr marL="1257300" lvl="2" indent="-342900">
+              <a:buFont typeface="Wingdings" panose="05000000000000000000" pitchFamily="2" charset="2"/>
+              <a:buChar char="Ø"/>
+            </a:pPr>
+            <a:r>
+              <a:rPr lang="fr-CA" dirty="0" smtClean="0"/>
+              <a:t>Réduit le nombre de développement</a:t>
+            </a:r>
+          </a:p>
+          <a:p>
+            <a:pPr marL="1257300" lvl="2" indent="-342900">
+              <a:buFont typeface="Wingdings" panose="05000000000000000000" pitchFamily="2" charset="2"/>
+              <a:buChar char="Ø"/>
+            </a:pPr>
+            <a:r>
+              <a:rPr lang="fr-CA" dirty="0"/>
+              <a:t>Réduit </a:t>
+            </a:r>
+            <a:r>
+              <a:rPr lang="fr-CA" dirty="0" smtClean="0"/>
+              <a:t>le nombre de thèmes</a:t>
+            </a:r>
+          </a:p>
+          <a:p>
+            <a:pPr marL="1257300" lvl="2" indent="-342900">
+              <a:buFont typeface="Wingdings" panose="05000000000000000000" pitchFamily="2" charset="2"/>
+              <a:buChar char="Ø"/>
+            </a:pPr>
+            <a:r>
+              <a:rPr lang="fr-CA" dirty="0"/>
+              <a:t>Réduit </a:t>
+            </a:r>
+            <a:r>
+              <a:rPr lang="fr-CA" dirty="0" smtClean="0"/>
+              <a:t>le nombre de </a:t>
+            </a:r>
+            <a:r>
+              <a:rPr lang="fr-CA" dirty="0" err="1" smtClean="0"/>
+              <a:t>yields</a:t>
+            </a:r>
             <a:endParaRPr lang="fr-CA" dirty="0" smtClean="0"/>
           </a:p>
           <a:p>
@@ -6027,7 +6024,7 @@
             </a:pPr>
             <a:r>
               <a:rPr lang="fr-CA" dirty="0" smtClean="0"/>
-              <a:t>Réduit le nombre de développement</a:t>
+              <a:t>Réduit le nombre d’actions</a:t>
             </a:r>
           </a:p>
           <a:p>
@@ -6036,12 +6033,8 @@
               <a:buChar char="Ø"/>
             </a:pPr>
             <a:r>
-              <a:rPr lang="fr-CA" dirty="0"/>
-              <a:t>Réduit </a:t>
-            </a:r>
-            <a:r>
               <a:rPr lang="fr-CA" dirty="0" smtClean="0"/>
-              <a:t>le nombre de thèmes</a:t>
+              <a:t>Réduit le nombre de transitions</a:t>
             </a:r>
           </a:p>
           <a:p>
@@ -6050,18 +6043,35 @@
               <a:buChar char="Ø"/>
             </a:pPr>
             <a:r>
+              <a:rPr lang="fr-CA" dirty="0" smtClean="0"/>
+              <a:t>Réduit le nombre de contraintes</a:t>
+            </a:r>
+          </a:p>
+          <a:p>
+            <a:pPr marL="800100" lvl="1" indent="-342900">
+              <a:buFont typeface="Wingdings" panose="05000000000000000000" pitchFamily="2" charset="2"/>
+              <a:buChar char="Ø"/>
+            </a:pPr>
+            <a:r>
+              <a:rPr lang="fr-CA" dirty="0" smtClean="0"/>
+              <a:t>Tout en s’assurant que le résultat du </a:t>
+            </a:r>
+            <a:r>
               <a:rPr lang="fr-CA" dirty="0"/>
-              <a:t>Réduit </a:t>
+              <a:t>modèle pré-solutionné </a:t>
             </a:r>
             <a:r>
               <a:rPr lang="fr-CA" dirty="0" smtClean="0"/>
-              <a:t>le nombre de </a:t>
-            </a:r>
-            <a:r>
-              <a:rPr lang="fr-CA" dirty="0" err="1" smtClean="0"/>
-              <a:t>yields</a:t>
-            </a:r>
-            <a:endParaRPr lang="fr-CA" dirty="0" smtClean="0"/>
+              <a:t>est équivalent au modèle </a:t>
+            </a:r>
+            <a:r>
+              <a:rPr lang="fr-CA" dirty="0"/>
+              <a:t>non </a:t>
+            </a:r>
+            <a:r>
+              <a:rPr lang="fr-CA" dirty="0" smtClean="0"/>
+              <a:t>pré-solutionné</a:t>
+            </a:r>
           </a:p>
           <a:p>
             <a:pPr marL="1257300" lvl="2" indent="-342900">
@@ -6070,66 +6080,8 @@
             </a:pPr>
             <a:r>
               <a:rPr lang="fr-CA" dirty="0" smtClean="0"/>
-              <a:t>Réduit le nombre d’actions</a:t>
-            </a:r>
-          </a:p>
-          <a:p>
-            <a:pPr marL="1257300" lvl="2" indent="-342900">
-              <a:buFont typeface="Wingdings" panose="05000000000000000000" pitchFamily="2" charset="2"/>
-              <a:buChar char="Ø"/>
-            </a:pPr>
-            <a:r>
-              <a:rPr lang="fr-CA" dirty="0" smtClean="0"/>
-              <a:t>Réduit le nombre de transitions</a:t>
-            </a:r>
-          </a:p>
-          <a:p>
-            <a:pPr marL="1257300" lvl="2" indent="-342900">
-              <a:buFont typeface="Wingdings" panose="05000000000000000000" pitchFamily="2" charset="2"/>
-              <a:buChar char="Ø"/>
-            </a:pPr>
-            <a:r>
-              <a:rPr lang="fr-CA" dirty="0" smtClean="0"/>
-              <a:t>Réduit le nombre de contraintes</a:t>
-            </a:r>
-            <a:endParaRPr lang="fr-CA" dirty="0" smtClean="0"/>
-          </a:p>
-          <a:p>
-            <a:pPr marL="800100" lvl="1" indent="-342900">
-              <a:buFont typeface="Wingdings" panose="05000000000000000000" pitchFamily="2" charset="2"/>
-              <a:buChar char="Ø"/>
-            </a:pPr>
-            <a:r>
-              <a:rPr lang="fr-CA" dirty="0" smtClean="0"/>
-              <a:t>Tout en s’assurant que le résultat du </a:t>
-            </a:r>
-            <a:r>
-              <a:rPr lang="fr-CA" dirty="0"/>
-              <a:t>modèle pré-solutionné </a:t>
-            </a:r>
-            <a:r>
-              <a:rPr lang="fr-CA" dirty="0" smtClean="0"/>
-              <a:t>est équivalent au modèle </a:t>
-            </a:r>
-            <a:r>
-              <a:rPr lang="fr-CA" dirty="0"/>
-              <a:t>non </a:t>
-            </a:r>
-            <a:r>
-              <a:rPr lang="fr-CA" dirty="0" smtClean="0"/>
-              <a:t>pré-solutionné</a:t>
-            </a:r>
-          </a:p>
-          <a:p>
-            <a:pPr marL="1257300" lvl="2" indent="-342900">
-              <a:buFont typeface="Wingdings" panose="05000000000000000000" pitchFamily="2" charset="2"/>
-              <a:buChar char="Ø"/>
-            </a:pPr>
-            <a:r>
-              <a:rPr lang="fr-CA" dirty="0" smtClean="0"/>
               <a:t>Le modèle pré-solutionné conserve les propriétés mathématique du modèle non pré-solutionné</a:t>
             </a:r>
-            <a:endParaRPr lang="fr-CA" dirty="0" smtClean="0"/>
           </a:p>
         </p:txBody>
       </p:sp>
@@ -6863,7 +6815,7 @@
           <p:cNvPr id="10241" name="Rectangle 2">
             <a:extLst>
               <a:ext uri="{FF2B5EF4-FFF2-40B4-BE49-F238E27FC236}">
-                <a16:creationId xmlns:a16="http://schemas.microsoft.com/office/drawing/2014/main" xmlns="" id="{2C64CE8F-6DC1-7B46-AA41-065734F9FFFA}"/>
+                <a16:creationId xmlns="" xmlns:a16="http://schemas.microsoft.com/office/drawing/2014/main" id="{2C64CE8F-6DC1-7B46-AA41-065734F9FFFA}"/>
               </a:ext>
             </a:extLst>
           </p:cNvPr>
@@ -6916,7 +6868,7 @@
           <p:cNvPr id="10243" name="Espace réservé du numéro de diapositive 1">
             <a:extLst>
               <a:ext uri="{FF2B5EF4-FFF2-40B4-BE49-F238E27FC236}">
-                <a16:creationId xmlns:a16="http://schemas.microsoft.com/office/drawing/2014/main" xmlns="" id="{A32D7E7E-5EC9-B640-8806-5F060AD25EEB}"/>
+                <a16:creationId xmlns="" xmlns:a16="http://schemas.microsoft.com/office/drawing/2014/main" id="{A32D7E7E-5EC9-B640-8806-5F060AD25EEB}"/>
               </a:ext>
             </a:extLst>
           </p:cNvPr>
@@ -7195,7 +7147,6 @@
               <a:rPr lang="fr-CA" dirty="0" smtClean="0"/>
               <a:t>-planification</a:t>
             </a:r>
-            <a:endParaRPr lang="fr-CA" dirty="0" smtClean="0"/>
           </a:p>
         </p:txBody>
       </p:sp>
@@ -7460,7 +7411,7 @@
           <p:cNvPr id="10241" name="Rectangle 2">
             <a:extLst>
               <a:ext uri="{FF2B5EF4-FFF2-40B4-BE49-F238E27FC236}">
-                <a16:creationId xmlns:a16="http://schemas.microsoft.com/office/drawing/2014/main" xmlns="" id="{2C64CE8F-6DC1-7B46-AA41-065734F9FFFA}"/>
+                <a16:creationId xmlns="" xmlns:a16="http://schemas.microsoft.com/office/drawing/2014/main" id="{2C64CE8F-6DC1-7B46-AA41-065734F9FFFA}"/>
               </a:ext>
             </a:extLst>
           </p:cNvPr>
@@ -7505,7 +7456,7 @@
           <p:cNvPr id="10243" name="Espace réservé du numéro de diapositive 1">
             <a:extLst>
               <a:ext uri="{FF2B5EF4-FFF2-40B4-BE49-F238E27FC236}">
-                <a16:creationId xmlns:a16="http://schemas.microsoft.com/office/drawing/2014/main" xmlns="" id="{A32D7E7E-5EC9-B640-8806-5F060AD25EEB}"/>
+                <a16:creationId xmlns="" xmlns:a16="http://schemas.microsoft.com/office/drawing/2014/main" id="{A32D7E7E-5EC9-B640-8806-5F060AD25EEB}"/>
               </a:ext>
             </a:extLst>
           </p:cNvPr>
@@ -8324,7 +8275,7 @@
           <p:cNvPr id="10241" name="Rectangle 2">
             <a:extLst>
               <a:ext uri="{FF2B5EF4-FFF2-40B4-BE49-F238E27FC236}">
-                <a16:creationId xmlns:a16="http://schemas.microsoft.com/office/drawing/2014/main" xmlns="" id="{2C64CE8F-6DC1-7B46-AA41-065734F9FFFA}"/>
+                <a16:creationId xmlns="" xmlns:a16="http://schemas.microsoft.com/office/drawing/2014/main" id="{2C64CE8F-6DC1-7B46-AA41-065734F9FFFA}"/>
               </a:ext>
             </a:extLst>
           </p:cNvPr>
@@ -8377,7 +8328,7 @@
           <p:cNvPr id="10243" name="Espace réservé du numéro de diapositive 1">
             <a:extLst>
               <a:ext uri="{FF2B5EF4-FFF2-40B4-BE49-F238E27FC236}">
-                <a16:creationId xmlns:a16="http://schemas.microsoft.com/office/drawing/2014/main" xmlns="" id="{A32D7E7E-5EC9-B640-8806-5F060AD25EEB}"/>
+                <a16:creationId xmlns="" xmlns:a16="http://schemas.microsoft.com/office/drawing/2014/main" id="{A32D7E7E-5EC9-B640-8806-5F060AD25EEB}"/>
               </a:ext>
             </a:extLst>
           </p:cNvPr>
@@ -8884,7 +8835,7 @@
           <p:cNvPr id="10241" name="Rectangle 2">
             <a:extLst>
               <a:ext uri="{FF2B5EF4-FFF2-40B4-BE49-F238E27FC236}">
-                <a16:creationId xmlns:a16="http://schemas.microsoft.com/office/drawing/2014/main" xmlns="" id="{2C64CE8F-6DC1-7B46-AA41-065734F9FFFA}"/>
+                <a16:creationId xmlns="" xmlns:a16="http://schemas.microsoft.com/office/drawing/2014/main" id="{2C64CE8F-6DC1-7B46-AA41-065734F9FFFA}"/>
               </a:ext>
             </a:extLst>
           </p:cNvPr>
@@ -8929,7 +8880,7 @@
           <p:cNvPr id="10243" name="Espace réservé du numéro de diapositive 1">
             <a:extLst>
               <a:ext uri="{FF2B5EF4-FFF2-40B4-BE49-F238E27FC236}">
-                <a16:creationId xmlns:a16="http://schemas.microsoft.com/office/drawing/2014/main" xmlns="" id="{A32D7E7E-5EC9-B640-8806-5F060AD25EEB}"/>
+                <a16:creationId xmlns="" xmlns:a16="http://schemas.microsoft.com/office/drawing/2014/main" id="{A32D7E7E-5EC9-B640-8806-5F060AD25EEB}"/>
               </a:ext>
             </a:extLst>
           </p:cNvPr>
@@ -9149,7 +9100,7 @@
         <p:spPr>
           <a:xfrm>
             <a:off x="237121" y="2321726"/>
-            <a:ext cx="10945216" cy="1200329"/>
+            <a:ext cx="10945216" cy="2677656"/>
           </a:xfrm>
           <a:prstGeom prst="rect">
             <a:avLst/>
@@ -9178,8 +9129,23 @@
             </a:pPr>
             <a:r>
               <a:rPr lang="fr-CA" dirty="0" smtClean="0"/>
-              <a:t>Si l’opérabilité ne peut et ne pourra avoir lieu dans le futur elle peut être éliminée</a:t>
-            </a:r>
+              <a:t>Si l’opérabilité ne peut et ne pourra avoir lieu dans le futur elle peut être </a:t>
+            </a:r>
+            <a:r>
+              <a:rPr lang="fr-CA" dirty="0" smtClean="0"/>
+              <a:t>éliminée.</a:t>
+            </a:r>
+          </a:p>
+          <a:p>
+            <a:pPr marL="1257300" lvl="2" indent="-342900">
+              <a:buFont typeface="Wingdings" panose="05000000000000000000" pitchFamily="2" charset="2"/>
+              <a:buChar char="Ø"/>
+            </a:pPr>
+            <a:r>
+              <a:rPr lang="fr-CA" dirty="0" smtClean="0"/>
+              <a:t>Si plusieurs opérabilités sont équivalentes pour une même action mais ont un masque différent celles-ci vont êtres agrégées ensemble et des agrégats d’attributs seront générés par FMT pour créer une syntaxe équivalente.</a:t>
+            </a:r>
+            <a:endParaRPr lang="fr-CA" dirty="0" smtClean="0"/>
           </a:p>
         </p:txBody>
       </p:sp>
@@ -9419,6 +9385,55 @@
                                         <p:tgtEl>
                                           <p:spTgt spid="31">
                                             <p:txEl>
+                                              <p:pRg st="2" end="2"/>
+                                            </p:txEl>
+                                          </p:spTgt>
+                                        </p:tgtEl>
+                                        <p:attrNameLst>
+                                          <p:attrName>style.visibility</p:attrName>
+                                        </p:attrNameLst>
+                                      </p:cBhvr>
+                                      <p:to>
+                                        <p:strVal val="visible"/>
+                                      </p:to>
+                                    </p:set>
+                                  </p:childTnLst>
+                                </p:cTn>
+                              </p:par>
+                            </p:childTnLst>
+                          </p:cTn>
+                        </p:par>
+                      </p:childTnLst>
+                    </p:cTn>
+                  </p:par>
+                  <p:par>
+                    <p:cTn id="19" fill="hold">
+                      <p:stCondLst>
+                        <p:cond delay="indefinite"/>
+                      </p:stCondLst>
+                      <p:childTnLst>
+                        <p:par>
+                          <p:cTn id="20" fill="hold">
+                            <p:stCondLst>
+                              <p:cond delay="0"/>
+                            </p:stCondLst>
+                            <p:childTnLst>
+                              <p:par>
+                                <p:cTn id="21" presetID="1" presetClass="entr" presetSubtype="0" fill="hold" nodeType="clickEffect">
+                                  <p:stCondLst>
+                                    <p:cond delay="0"/>
+                                  </p:stCondLst>
+                                  <p:childTnLst>
+                                    <p:set>
+                                      <p:cBhvr>
+                                        <p:cTn id="22" dur="1" fill="hold">
+                                          <p:stCondLst>
+                                            <p:cond delay="0"/>
+                                          </p:stCondLst>
+                                        </p:cTn>
+                                        <p:tgtEl>
+                                          <p:spTgt spid="31">
+                                            <p:txEl>
                                               <p:pRg st="0" end="0"/>
                                             </p:txEl>
                                           </p:spTgt>
@@ -9435,14 +9450,14 @@
                                 </p:cTn>
                               </p:par>
                               <p:par>
-                                <p:cTn id="19" presetID="9" presetClass="emph" presetSubtype="0" nodeType="withEffect">
+                                <p:cTn id="23" presetID="9" presetClass="emph" presetSubtype="0" nodeType="withEffect">
                                   <p:stCondLst>
                                     <p:cond delay="0"/>
                                   </p:stCondLst>
                                   <p:childTnLst>
                                     <p:set>
                                       <p:cBhvr rctx="PPT">
-                                        <p:cTn id="20" dur="indefinite"/>
+                                        <p:cTn id="24" dur="indefinite"/>
                                         <p:tgtEl>
                                           <p:spTgt spid="5">
                                             <p:txEl>
@@ -9460,7 +9475,7 @@
                                     </p:set>
                                     <p:animEffect filter="image" prLst="opacity: 0.5">
                                       <p:cBhvr rctx="IE">
-                                        <p:cTn id="21" dur="indefinite"/>
+                                        <p:cTn id="25" dur="indefinite"/>
                                         <p:tgtEl>
                                           <p:spTgt spid="5">
                                             <p:txEl>
@@ -9474,14 +9489,14 @@
                                 </p:cTn>
                               </p:par>
                               <p:par>
-                                <p:cTn id="22" presetID="9" presetClass="emph" presetSubtype="0" nodeType="withEffect">
+                                <p:cTn id="26" presetID="9" presetClass="emph" presetSubtype="0" nodeType="withEffect">
                                   <p:stCondLst>
                                     <p:cond delay="0"/>
                                   </p:stCondLst>
                                   <p:childTnLst>
                                     <p:set>
                                       <p:cBhvr rctx="PPT">
-                                        <p:cTn id="23" dur="indefinite"/>
+                                        <p:cTn id="27" dur="indefinite"/>
                                         <p:tgtEl>
                                           <p:spTgt spid="5">
                                             <p:txEl>
@@ -9499,7 +9514,7 @@
                                     </p:set>
                                     <p:animEffect filter="image" prLst="opacity: 0.5">
                                       <p:cBhvr rctx="IE">
-                                        <p:cTn id="24" dur="indefinite"/>
+                                        <p:cTn id="28" dur="indefinite"/>
                                         <p:tgtEl>
                                           <p:spTgt spid="5">
                                             <p:txEl>
@@ -9565,7 +9580,7 @@
           <p:cNvPr id="10241" name="Rectangle 2">
             <a:extLst>
               <a:ext uri="{FF2B5EF4-FFF2-40B4-BE49-F238E27FC236}">
-                <a16:creationId xmlns:a16="http://schemas.microsoft.com/office/drawing/2014/main" xmlns="" id="{2C64CE8F-6DC1-7B46-AA41-065734F9FFFA}"/>
+                <a16:creationId xmlns="" xmlns:a16="http://schemas.microsoft.com/office/drawing/2014/main" id="{2C64CE8F-6DC1-7B46-AA41-065734F9FFFA}"/>
               </a:ext>
             </a:extLst>
           </p:cNvPr>
@@ -9610,7 +9625,7 @@
           <p:cNvPr id="10243" name="Espace réservé du numéro de diapositive 1">
             <a:extLst>
               <a:ext uri="{FF2B5EF4-FFF2-40B4-BE49-F238E27FC236}">
-                <a16:creationId xmlns:a16="http://schemas.microsoft.com/office/drawing/2014/main" xmlns="" id="{A32D7E7E-5EC9-B640-8806-5F060AD25EEB}"/>
+                <a16:creationId xmlns="" xmlns:a16="http://schemas.microsoft.com/office/drawing/2014/main" id="{A32D7E7E-5EC9-B640-8806-5F060AD25EEB}"/>
               </a:ext>
             </a:extLst>
           </p:cNvPr>
@@ -9830,7 +9845,7 @@
         <p:spPr>
           <a:xfrm>
             <a:off x="237121" y="1982400"/>
-            <a:ext cx="10945216" cy="1200329"/>
+            <a:ext cx="10945216" cy="2677656"/>
           </a:xfrm>
           <a:prstGeom prst="rect">
             <a:avLst/>
@@ -9867,8 +9882,59 @@
             </a:pPr>
             <a:r>
               <a:rPr lang="fr-CA" dirty="0" smtClean="0"/>
-              <a:t>Si ceux-ci n’existe pas et n’existeront pas dans le futur elles peuvent êtres éliminées</a:t>
-            </a:r>
+              <a:t>Si ceux-ci n’existe pas et n’existeront pas dans le futur elles peuvent êtres </a:t>
+            </a:r>
+            <a:r>
+              <a:rPr lang="fr-CA" dirty="0" smtClean="0"/>
+              <a:t>éliminées</a:t>
+            </a:r>
+          </a:p>
+          <a:p>
+            <a:pPr marL="1257300" lvl="2" indent="-342900">
+              <a:buFont typeface="Wingdings" panose="05000000000000000000" pitchFamily="2" charset="2"/>
+              <a:buChar char="Ø"/>
+            </a:pPr>
+            <a:r>
+              <a:rPr lang="fr-CA" dirty="0"/>
+              <a:t>Si plusieurs </a:t>
+            </a:r>
+            <a:r>
+              <a:rPr lang="fr-CA" dirty="0" smtClean="0"/>
+              <a:t>sources et </a:t>
+            </a:r>
+            <a:r>
+              <a:rPr lang="fr-CA" dirty="0" err="1" smtClean="0"/>
+              <a:t>targets</a:t>
+            </a:r>
+            <a:r>
+              <a:rPr lang="fr-CA" dirty="0" smtClean="0"/>
+              <a:t> </a:t>
+            </a:r>
+            <a:r>
+              <a:rPr lang="fr-CA" dirty="0"/>
+              <a:t>sont équivalentes pour une même </a:t>
+            </a:r>
+            <a:r>
+              <a:rPr lang="fr-CA" dirty="0" smtClean="0"/>
+              <a:t>transition </a:t>
+            </a:r>
+            <a:r>
+              <a:rPr lang="fr-CA" dirty="0"/>
+              <a:t>mais </a:t>
+            </a:r>
+            <a:r>
+              <a:rPr lang="fr-CA" dirty="0" smtClean="0"/>
+              <a:t>ont </a:t>
+            </a:r>
+            <a:r>
+              <a:rPr lang="fr-CA" dirty="0"/>
+              <a:t>un masque différent celles-ci vont êtres agrégées ensemble et des agrégats d’attributs seront générés par FMT pour créer une syntaxe équivalente</a:t>
+            </a:r>
+            <a:r>
+              <a:rPr lang="fr-CA" dirty="0" smtClean="0"/>
+              <a:t>.</a:t>
+            </a:r>
+            <a:endParaRPr lang="fr-CA" dirty="0"/>
           </a:p>
         </p:txBody>
       </p:sp>
@@ -10207,6 +10273,55 @@
                       </p:childTnLst>
                     </p:cTn>
                   </p:par>
+                  <p:par>
+                    <p:cTn id="25" fill="hold">
+                      <p:stCondLst>
+                        <p:cond delay="indefinite"/>
+                      </p:stCondLst>
+                      <p:childTnLst>
+                        <p:par>
+                          <p:cTn id="26" fill="hold">
+                            <p:stCondLst>
+                              <p:cond delay="0"/>
+                            </p:stCondLst>
+                            <p:childTnLst>
+                              <p:par>
+                                <p:cTn id="27" presetID="1" presetClass="entr" presetSubtype="0" fill="hold" nodeType="clickEffect">
+                                  <p:stCondLst>
+                                    <p:cond delay="0"/>
+                                  </p:stCondLst>
+                                  <p:childTnLst>
+                                    <p:set>
+                                      <p:cBhvr>
+                                        <p:cTn id="28" dur="1" fill="hold">
+                                          <p:stCondLst>
+                                            <p:cond delay="0"/>
+                                          </p:stCondLst>
+                                        </p:cTn>
+                                        <p:tgtEl>
+                                          <p:spTgt spid="31">
+                                            <p:txEl>
+                                              <p:pRg st="2" end="2"/>
+                                            </p:txEl>
+                                          </p:spTgt>
+                                        </p:tgtEl>
+                                        <p:attrNameLst>
+                                          <p:attrName>style.visibility</p:attrName>
+                                        </p:attrNameLst>
+                                      </p:cBhvr>
+                                      <p:to>
+                                        <p:strVal val="visible"/>
+                                      </p:to>
+                                    </p:set>
+                                  </p:childTnLst>
+                                </p:cTn>
+                              </p:par>
+                            </p:childTnLst>
+                          </p:cTn>
+                        </p:par>
+                      </p:childTnLst>
+                    </p:cTn>
+                  </p:par>
                 </p:childTnLst>
               </p:cTn>
               <p:prevCondLst>
@@ -10254,7 +10369,7 @@
           <p:cNvPr id="10241" name="Rectangle 2">
             <a:extLst>
               <a:ext uri="{FF2B5EF4-FFF2-40B4-BE49-F238E27FC236}">
-                <a16:creationId xmlns:a16="http://schemas.microsoft.com/office/drawing/2014/main" xmlns="" id="{2C64CE8F-6DC1-7B46-AA41-065734F9FFFA}"/>
+                <a16:creationId xmlns="" xmlns:a16="http://schemas.microsoft.com/office/drawing/2014/main" id="{2C64CE8F-6DC1-7B46-AA41-065734F9FFFA}"/>
               </a:ext>
             </a:extLst>
           </p:cNvPr>
@@ -10299,7 +10414,7 @@
           <p:cNvPr id="10243" name="Espace réservé du numéro de diapositive 1">
             <a:extLst>
               <a:ext uri="{FF2B5EF4-FFF2-40B4-BE49-F238E27FC236}">
-                <a16:creationId xmlns:a16="http://schemas.microsoft.com/office/drawing/2014/main" xmlns="" id="{A32D7E7E-5EC9-B640-8806-5F060AD25EEB}"/>
+                <a16:creationId xmlns="" xmlns:a16="http://schemas.microsoft.com/office/drawing/2014/main" id="{A32D7E7E-5EC9-B640-8806-5F060AD25EEB}"/>
               </a:ext>
             </a:extLst>
           </p:cNvPr>
@@ -10796,7 +10911,7 @@
           <p:cNvPr id="10241" name="Rectangle 2">
             <a:extLst>
               <a:ext uri="{FF2B5EF4-FFF2-40B4-BE49-F238E27FC236}">
-                <a16:creationId xmlns:a16="http://schemas.microsoft.com/office/drawing/2014/main" xmlns="" id="{2C64CE8F-6DC1-7B46-AA41-065734F9FFFA}"/>
+                <a16:creationId xmlns="" xmlns:a16="http://schemas.microsoft.com/office/drawing/2014/main" id="{2C64CE8F-6DC1-7B46-AA41-065734F9FFFA}"/>
               </a:ext>
             </a:extLst>
           </p:cNvPr>
@@ -10841,7 +10956,7 @@
           <p:cNvPr id="10243" name="Espace réservé du numéro de diapositive 1">
             <a:extLst>
               <a:ext uri="{FF2B5EF4-FFF2-40B4-BE49-F238E27FC236}">
-                <a16:creationId xmlns:a16="http://schemas.microsoft.com/office/drawing/2014/main" xmlns="" id="{A32D7E7E-5EC9-B640-8806-5F060AD25EEB}"/>
+                <a16:creationId xmlns="" xmlns:a16="http://schemas.microsoft.com/office/drawing/2014/main" id="{A32D7E7E-5EC9-B640-8806-5F060AD25EEB}"/>
               </a:ext>
             </a:extLst>
           </p:cNvPr>
@@ -11871,7 +11986,7 @@
         <a:effectLst/>
         <a:extLst>
           <a:ext uri="{AF507438-7753-43e0-B8FC-AC1667EBCBE1}">
-            <a14:hiddenEffects xmlns:a14="http://schemas.microsoft.com/office/drawing/2010/main" xmlns="">
+            <a14:hiddenEffects xmlns="" xmlns:a14="http://schemas.microsoft.com/office/drawing/2010/main">
               <a:effectLst>
                 <a:outerShdw blurRad="63500" dist="38099" dir="2700000" algn="ctr" rotWithShape="0">
                   <a:schemeClr val="bg2">
@@ -11948,7 +12063,7 @@
         <a:effectLst/>
         <a:extLst>
           <a:ext uri="{AF507438-7753-43e0-B8FC-AC1667EBCBE1}">
-            <a14:hiddenEffects xmlns:a14="http://schemas.microsoft.com/office/drawing/2010/main" xmlns="">
+            <a14:hiddenEffects xmlns="" xmlns:a14="http://schemas.microsoft.com/office/drawing/2010/main">
               <a:effectLst>
                 <a:outerShdw blurRad="63500" dist="38099" dir="2700000" algn="ctr" rotWithShape="0">
                   <a:schemeClr val="bg2">
@@ -12740,7 +12855,7 @@
         <a:effectLst/>
         <a:extLst>
           <a:ext uri="{AF507438-7753-43e0-B8FC-AC1667EBCBE1}">
-            <a14:hiddenEffects xmlns="" xmlns:a14="http://schemas.microsoft.com/office/drawing/2010/main">
+            <a14:hiddenEffects xmlns:a14="http://schemas.microsoft.com/office/drawing/2010/main" xmlns="">
               <a:effectLst>
                 <a:outerShdw blurRad="63500" dist="38099" dir="2700000" algn="ctr" rotWithShape="0">
                   <a:schemeClr val="bg2">
@@ -12817,7 +12932,7 @@
         <a:effectLst/>
         <a:extLst>
           <a:ext uri="{AF507438-7753-43e0-B8FC-AC1667EBCBE1}">
-            <a14:hiddenEffects xmlns="" xmlns:a14="http://schemas.microsoft.com/office/drawing/2010/main">
+            <a14:hiddenEffects xmlns:a14="http://schemas.microsoft.com/office/drawing/2010/main" xmlns="">
               <a:effectLst>
                 <a:outerShdw blurRad="63500" dist="38099" dir="2700000" algn="ctr" rotWithShape="0">
                   <a:schemeClr val="bg2">
@@ -14013,15 +14128,6 @@
 </file>
 
 <file path=customXml/item2.xml><?xml version="1.0" encoding="utf-8"?>
-<?mso-contentType ?>
-<FormTemplates xmlns="http://schemas.microsoft.com/sharepoint/v3/contenttype/forms">
-  <Display>DocumentLibraryForm</Display>
-  <Edit>DocumentLibraryForm</Edit>
-  <New>DocumentLibraryForm</New>
-</FormTemplates>
-</file>
-
-<file path=customXml/item3.xml><?xml version="1.0" encoding="utf-8"?>
 <ct:contentTypeSchema xmlns:ct="http://schemas.microsoft.com/office/2006/metadata/contentType" xmlns:ma="http://schemas.microsoft.com/office/2006/metadata/properties/metaAttributes" ct:_="" ma:_="" ma:contentTypeName="Document" ma:contentTypeID="0x010100308D8C7535AC984C954409E86008B6B1" ma:contentTypeVersion="5" ma:contentTypeDescription="Crée un document." ma:contentTypeScope="" ma:versionID="b98d606db1d8981b42c20d29caab754c">
   <xsd:schema xmlns:xsd="http://www.w3.org/2001/XMLSchema" xmlns:xs="http://www.w3.org/2001/XMLSchema" xmlns:p="http://schemas.microsoft.com/office/2006/metadata/properties" xmlns:ns2="785701b4-08d1-402f-a497-f2f813221731" targetNamespace="http://schemas.microsoft.com/office/2006/metadata/properties" ma:root="true" ma:fieldsID="77ff28afb2ad7804448e564e5d4b2614" ns2:_="">
     <xsd:import namespace="785701b4-08d1-402f-a497-f2f813221731"/>
@@ -14167,6 +14273,15 @@
 </ct:contentTypeSchema>
 </file>
 
+<file path=customXml/item3.xml><?xml version="1.0" encoding="utf-8"?>
+<?mso-contentType ?>
+<FormTemplates xmlns="http://schemas.microsoft.com/sharepoint/v3/contenttype/forms">
+  <Display>DocumentLibraryForm</Display>
+  <Edit>DocumentLibraryForm</Edit>
+  <New>DocumentLibraryForm</New>
+</FormTemplates>
+</file>
+
 <file path=customXml/itemProps1.xml><?xml version="1.0" encoding="utf-8"?>
 <ds:datastoreItem xmlns:ds="http://schemas.openxmlformats.org/officeDocument/2006/customXml" ds:itemID="{F15BDF4D-C324-48A5-91B7-E22D7BB1F0AC}">
   <ds:schemaRefs>
@@ -14184,14 +14299,6 @@
 </file>
 
 <file path=customXml/itemProps2.xml><?xml version="1.0" encoding="utf-8"?>
-<ds:datastoreItem xmlns:ds="http://schemas.openxmlformats.org/officeDocument/2006/customXml" ds:itemID="{36B87F5F-D7D2-4A03-9569-C00D818199E2}">
-  <ds:schemaRefs>
-    <ds:schemaRef ds:uri="http://schemas.microsoft.com/sharepoint/v3/contenttype/forms"/>
-  </ds:schemaRefs>
-</ds:datastoreItem>
-</file>
-
-<file path=customXml/itemProps3.xml><?xml version="1.0" encoding="utf-8"?>
 <ds:datastoreItem xmlns:ds="http://schemas.openxmlformats.org/officeDocument/2006/customXml" ds:itemID="{05EA8467-0C25-4D82-95B8-4F4EEEE26BDC}">
   <ds:schemaRefs>
     <ds:schemaRef ds:uri="http://schemas.microsoft.com/office/2006/metadata/contentType"/>
@@ -14207,4 +14314,12 @@
     <ds:schemaRef ds:uri="http://schemas.microsoft.com/internal/obd"/>
   </ds:schemaRefs>
 </ds:datastoreItem>
+</file>
+
+<file path=customXml/itemProps3.xml><?xml version="1.0" encoding="utf-8"?>
+<ds:datastoreItem xmlns:ds="http://schemas.openxmlformats.org/officeDocument/2006/customXml" ds:itemID="{36B87F5F-D7D2-4A03-9569-C00D818199E2}">
+  <ds:schemaRefs>
+    <ds:schemaRef ds:uri="http://schemas.microsoft.com/sharepoint/v3/contenttype/forms"/>
+  </ds:schemaRefs>
+</ds:datastoreItem>
 </file>
</xml_diff>